<commit_message>
Committing because the loaner is going to explode soon.
</commit_message>
<xml_diff>
--- a/262/Lectures/Ch2ComputingProfessionsAndProfessionalEthics.pptx
+++ b/262/Lectures/Ch2ComputingProfessionsAndProfessionalEthics.pptx
@@ -1226,9 +1226,14 @@
   <p:clrMapOvr>
     <a:masterClrMapping/>
   </p:clrMapOvr>
-  <p:transition>
-    <p:zoom dir="in"/>
-  </p:transition>
+  <mc:AlternateContent xmlns:mc="http://schemas.openxmlformats.org/markup-compatibility/2006">
+    <mc:Choice xmlns:p14="http://schemas.microsoft.com/office/powerpoint/2010/main" Requires="p14">
+      <p:transition p14:dur="0"/>
+    </mc:Choice>
+    <mc:Fallback>
+      <p:transition/>
+    </mc:Fallback>
+  </mc:AlternateContent>
 </p:sldLayout>
 </file>
 
@@ -1409,9 +1414,14 @@
   <p:clrMapOvr>
     <a:masterClrMapping/>
   </p:clrMapOvr>
-  <p:transition>
-    <p:zoom dir="in"/>
-  </p:transition>
+  <mc:AlternateContent xmlns:mc="http://schemas.openxmlformats.org/markup-compatibility/2006">
+    <mc:Choice xmlns:p14="http://schemas.microsoft.com/office/powerpoint/2010/main" Requires="p14">
+      <p:transition p14:dur="0"/>
+    </mc:Choice>
+    <mc:Fallback>
+      <p:transition/>
+    </mc:Fallback>
+  </mc:AlternateContent>
 </p:sldLayout>
 </file>
 
@@ -1602,9 +1612,14 @@
   <p:clrMapOvr>
     <a:masterClrMapping/>
   </p:clrMapOvr>
-  <p:transition>
-    <p:zoom dir="in"/>
-  </p:transition>
+  <mc:AlternateContent xmlns:mc="http://schemas.openxmlformats.org/markup-compatibility/2006">
+    <mc:Choice xmlns:p14="http://schemas.microsoft.com/office/powerpoint/2010/main" Requires="p14">
+      <p:transition p14:dur="0"/>
+    </mc:Choice>
+    <mc:Fallback>
+      <p:transition/>
+    </mc:Fallback>
+  </mc:AlternateContent>
 </p:sldLayout>
 </file>
 
@@ -1867,9 +1882,14 @@
   <p:clrMapOvr>
     <a:masterClrMapping/>
   </p:clrMapOvr>
-  <p:transition>
-    <p:zoom dir="in"/>
-  </p:transition>
+  <mc:AlternateContent xmlns:mc="http://schemas.openxmlformats.org/markup-compatibility/2006">
+    <mc:Choice xmlns:p14="http://schemas.microsoft.com/office/powerpoint/2010/main" Requires="p14">
+      <p:transition p14:dur="0"/>
+    </mc:Choice>
+    <mc:Fallback>
+      <p:transition/>
+    </mc:Fallback>
+  </mc:AlternateContent>
 </p:sldLayout>
 </file>
 
@@ -2050,9 +2070,14 @@
   <p:clrMapOvr>
     <a:masterClrMapping/>
   </p:clrMapOvr>
-  <p:transition>
-    <p:zoom dir="in"/>
-  </p:transition>
+  <mc:AlternateContent xmlns:mc="http://schemas.openxmlformats.org/markup-compatibility/2006">
+    <mc:Choice xmlns:p14="http://schemas.microsoft.com/office/powerpoint/2010/main" Requires="p14">
+      <p:transition p14:dur="0"/>
+    </mc:Choice>
+    <mc:Fallback>
+      <p:transition/>
+    </mc:Fallback>
+  </mc:AlternateContent>
 </p:sldLayout>
 </file>
 
@@ -2255,9 +2280,14 @@
   <p:clrMapOvr>
     <a:masterClrMapping/>
   </p:clrMapOvr>
-  <p:transition>
-    <p:zoom dir="in"/>
-  </p:transition>
+  <mc:AlternateContent xmlns:mc="http://schemas.openxmlformats.org/markup-compatibility/2006">
+    <mc:Choice xmlns:p14="http://schemas.microsoft.com/office/powerpoint/2010/main" Requires="p14">
+      <p:transition p14:dur="0"/>
+    </mc:Choice>
+    <mc:Fallback>
+      <p:transition/>
+    </mc:Fallback>
+  </mc:AlternateContent>
 </p:sldLayout>
 </file>
 
@@ -2556,9 +2586,14 @@
   <p:clrMapOvr>
     <a:masterClrMapping/>
   </p:clrMapOvr>
-  <p:transition>
-    <p:zoom dir="in"/>
-  </p:transition>
+  <mc:AlternateContent xmlns:mc="http://schemas.openxmlformats.org/markup-compatibility/2006">
+    <mc:Choice xmlns:p14="http://schemas.microsoft.com/office/powerpoint/2010/main" Requires="p14">
+      <p:transition p14:dur="0"/>
+    </mc:Choice>
+    <mc:Fallback>
+      <p:transition/>
+    </mc:Fallback>
+  </mc:AlternateContent>
 </p:sldLayout>
 </file>
 
@@ -2996,9 +3031,14 @@
   <p:clrMapOvr>
     <a:masterClrMapping/>
   </p:clrMapOvr>
-  <p:transition>
-    <p:zoom dir="in"/>
-  </p:transition>
+  <mc:AlternateContent xmlns:mc="http://schemas.openxmlformats.org/markup-compatibility/2006">
+    <mc:Choice xmlns:p14="http://schemas.microsoft.com/office/powerpoint/2010/main" Requires="p14">
+      <p:transition p14:dur="0"/>
+    </mc:Choice>
+    <mc:Fallback>
+      <p:transition/>
+    </mc:Fallback>
+  </mc:AlternateContent>
 </p:sldLayout>
 </file>
 
@@ -3127,9 +3167,14 @@
   <p:clrMapOvr>
     <a:masterClrMapping/>
   </p:clrMapOvr>
-  <p:transition>
-    <p:zoom dir="in"/>
-  </p:transition>
+  <mc:AlternateContent xmlns:mc="http://schemas.openxmlformats.org/markup-compatibility/2006">
+    <mc:Choice xmlns:p14="http://schemas.microsoft.com/office/powerpoint/2010/main" Requires="p14">
+      <p:transition p14:dur="0"/>
+    </mc:Choice>
+    <mc:Fallback>
+      <p:transition/>
+    </mc:Fallback>
+  </mc:AlternateContent>
 </p:sldLayout>
 </file>
 
@@ -3235,9 +3280,14 @@
   <p:clrMapOvr>
     <a:masterClrMapping/>
   </p:clrMapOvr>
-  <p:transition>
-    <p:zoom dir="in"/>
-  </p:transition>
+  <mc:AlternateContent xmlns:mc="http://schemas.openxmlformats.org/markup-compatibility/2006">
+    <mc:Choice xmlns:p14="http://schemas.microsoft.com/office/powerpoint/2010/main" Requires="p14">
+      <p:transition p14:dur="0"/>
+    </mc:Choice>
+    <mc:Fallback>
+      <p:transition/>
+    </mc:Fallback>
+  </mc:AlternateContent>
 </p:sldLayout>
 </file>
 
@@ -3525,9 +3575,14 @@
   <p:clrMapOvr>
     <a:masterClrMapping/>
   </p:clrMapOvr>
-  <p:transition>
-    <p:zoom dir="in"/>
-  </p:transition>
+  <mc:AlternateContent xmlns:mc="http://schemas.openxmlformats.org/markup-compatibility/2006">
+    <mc:Choice xmlns:p14="http://schemas.microsoft.com/office/powerpoint/2010/main" Requires="p14">
+      <p:transition p14:dur="0"/>
+    </mc:Choice>
+    <mc:Fallback>
+      <p:transition/>
+    </mc:Fallback>
+  </mc:AlternateContent>
 </p:sldLayout>
 </file>
 
@@ -3791,9 +3846,14 @@
   <p:clrMapOvr>
     <a:masterClrMapping/>
   </p:clrMapOvr>
-  <p:transition>
-    <p:zoom dir="in"/>
-  </p:transition>
+  <mc:AlternateContent xmlns:mc="http://schemas.openxmlformats.org/markup-compatibility/2006">
+    <mc:Choice xmlns:p14="http://schemas.microsoft.com/office/powerpoint/2010/main" Requires="p14">
+      <p:transition p14:dur="0"/>
+    </mc:Choice>
+    <mc:Fallback>
+      <p:transition/>
+    </mc:Fallback>
+  </mc:AlternateContent>
 </p:sldLayout>
 </file>
 
@@ -4129,9 +4189,14 @@
     <p:sldLayoutId id="2147483660" r:id="rId11"/>
     <p:sldLayoutId id="2147483661" r:id="rId12"/>
   </p:sldLayoutIdLst>
-  <p:transition>
-    <p:zoom dir="in"/>
-  </p:transition>
+  <mc:AlternateContent xmlns:mc="http://schemas.openxmlformats.org/markup-compatibility/2006">
+    <mc:Choice xmlns:p14="http://schemas.microsoft.com/office/powerpoint/2010/main" Requires="p14">
+      <p:transition p14:dur="0"/>
+    </mc:Choice>
+    <mc:Fallback>
+      <p:transition/>
+    </mc:Fallback>
+  </mc:AlternateContent>
   <p:hf hdr="0"/>
   <p:txStyles>
     <p:titleStyle>
@@ -4652,10 +4717,6 @@
               <a:rPr lang="en-US" b="1" dirty="0" smtClean="0"/>
               <a:t> </a:t>
             </a:r>
-            <a:r>
-              <a:rPr lang="en-US" b="1" dirty="0" smtClean="0"/>
-              <a:t/>
-            </a:r>
             <a:br>
               <a:rPr lang="en-US" b="1" dirty="0" smtClean="0"/>
             </a:br>
@@ -4679,9 +4740,14 @@
   <p:clrMapOvr>
     <a:masterClrMapping/>
   </p:clrMapOvr>
-  <p:transition>
-    <p:zoom dir="in"/>
-  </p:transition>
+  <mc:AlternateContent xmlns:mc="http://schemas.openxmlformats.org/markup-compatibility/2006">
+    <mc:Choice xmlns:p14="http://schemas.microsoft.com/office/powerpoint/2010/main" Requires="p14">
+      <p:transition p14:dur="0"/>
+    </mc:Choice>
+    <mc:Fallback>
+      <p:transition/>
+    </mc:Fallback>
+  </mc:AlternateContent>
   <p:timing>
     <p:tnLst>
       <p:par>
@@ -4827,9 +4893,14 @@
   <p:clrMapOvr>
     <a:masterClrMapping/>
   </p:clrMapOvr>
-  <p:transition>
-    <p:zoom dir="in"/>
-  </p:transition>
+  <mc:AlternateContent xmlns:mc="http://schemas.openxmlformats.org/markup-compatibility/2006">
+    <mc:Choice xmlns:p14="http://schemas.microsoft.com/office/powerpoint/2010/main" Requires="p14">
+      <p:transition p14:dur="0"/>
+    </mc:Choice>
+    <mc:Fallback>
+      <p:transition/>
+    </mc:Fallback>
+  </mc:AlternateContent>
   <p:timing>
     <p:tnLst>
       <p:par>
@@ -5003,9 +5074,14 @@
   <p:clrMapOvr>
     <a:masterClrMapping/>
   </p:clrMapOvr>
-  <p:transition>
-    <p:zoom dir="in"/>
-  </p:transition>
+  <mc:AlternateContent xmlns:mc="http://schemas.openxmlformats.org/markup-compatibility/2006">
+    <mc:Choice xmlns:p14="http://schemas.microsoft.com/office/powerpoint/2010/main" Requires="p14">
+      <p:transition p14:dur="0"/>
+    </mc:Choice>
+    <mc:Fallback>
+      <p:transition/>
+    </mc:Fallback>
+  </mc:AlternateContent>
   <p:timing>
     <p:tnLst>
       <p:par>
@@ -5131,9 +5207,14 @@
   <p:clrMapOvr>
     <a:masterClrMapping/>
   </p:clrMapOvr>
-  <p:transition>
-    <p:zoom dir="in"/>
-  </p:transition>
+  <mc:AlternateContent xmlns:mc="http://schemas.openxmlformats.org/markup-compatibility/2006">
+    <mc:Choice xmlns:p14="http://schemas.microsoft.com/office/powerpoint/2010/main" Requires="p14">
+      <p:transition p14:dur="0"/>
+    </mc:Choice>
+    <mc:Fallback>
+      <p:transition/>
+    </mc:Fallback>
+  </mc:AlternateContent>
   <p:timing>
     <p:tnLst>
       <p:par>
@@ -5178,7 +5259,15 @@
           <a:p>
             <a:r>
               <a:rPr lang="en-US" sz="4400" dirty="0" smtClean="0"/>
-              <a:t>Profession?   Definition of </a:t>
+              <a:t>Profession? </a:t>
+            </a:r>
+            <a:r>
+              <a:rPr lang="en-US" sz="4400" dirty="0" smtClean="0"/>
+              <a:t>Definition </a:t>
+            </a:r>
+            <a:r>
+              <a:rPr lang="en-US" sz="4400" dirty="0" smtClean="0"/>
+              <a:t>of </a:t>
             </a:r>
             <a:r>
               <a:rPr lang="en-US" sz="4400" dirty="0" err="1" smtClean="0"/>
@@ -5353,9 +5442,14 @@
   <p:clrMapOvr>
     <a:masterClrMapping/>
   </p:clrMapOvr>
-  <p:transition>
-    <p:zoom dir="in"/>
-  </p:transition>
+  <mc:AlternateContent xmlns:mc="http://schemas.openxmlformats.org/markup-compatibility/2006">
+    <mc:Choice xmlns:p14="http://schemas.microsoft.com/office/powerpoint/2010/main" Requires="p14">
+      <p:transition p14:dur="0"/>
+    </mc:Choice>
+    <mc:Fallback>
+      <p:transition/>
+    </mc:Fallback>
+  </mc:AlternateContent>
   <p:timing>
     <p:tnLst>
       <p:par>
@@ -5522,9 +5616,14 @@
   <p:clrMapOvr>
     <a:masterClrMapping/>
   </p:clrMapOvr>
-  <p:transition>
-    <p:zoom dir="in"/>
-  </p:transition>
+  <mc:AlternateContent xmlns:mc="http://schemas.openxmlformats.org/markup-compatibility/2006">
+    <mc:Choice xmlns:p14="http://schemas.microsoft.com/office/powerpoint/2010/main" Requires="p14">
+      <p:transition p14:dur="0"/>
+    </mc:Choice>
+    <mc:Fallback>
+      <p:transition/>
+    </mc:Fallback>
+  </mc:AlternateContent>
   <p:timing>
     <p:tnLst>
       <p:par>
@@ -5724,9 +5823,21 @@
   <p:clrMapOvr>
     <a:masterClrMapping/>
   </p:clrMapOvr>
-  <p:transition>
-    <p:zoom dir="in"/>
-  </p:transition>
+  <mc:AlternateContent xmlns:mc="http://schemas.openxmlformats.org/markup-compatibility/2006">
+    <mc:Choice xmlns:p14="http://schemas.microsoft.com/office/powerpoint/2010/main" Requires="p14">
+      <p:transition p14:dur="0"/>
+    </mc:Choice>
+    <mc:Fallback>
+      <p:transition/>
+    </mc:Fallback>
+  </mc:AlternateContent>
+  <p:timing>
+    <p:tnLst>
+      <p:par>
+        <p:cTn id="1" dur="indefinite" restart="never" nodeType="tmRoot"/>
+      </p:par>
+    </p:tnLst>
+  </p:timing>
 </p:sld>
 </file>
 
@@ -5893,9 +6004,14 @@
   <p:clrMapOvr>
     <a:masterClrMapping/>
   </p:clrMapOvr>
-  <p:transition>
-    <p:zoom dir="in"/>
-  </p:transition>
+  <mc:AlternateContent xmlns:mc="http://schemas.openxmlformats.org/markup-compatibility/2006">
+    <mc:Choice xmlns:p14="http://schemas.microsoft.com/office/powerpoint/2010/main" Requires="p14">
+      <p:transition p14:dur="0"/>
+    </mc:Choice>
+    <mc:Fallback>
+      <p:transition/>
+    </mc:Fallback>
+  </mc:AlternateContent>
   <p:timing>
     <p:tnLst>
       <p:par>
@@ -6047,9 +6163,14 @@
   <p:clrMapOvr>
     <a:masterClrMapping/>
   </p:clrMapOvr>
-  <p:transition>
-    <p:zoom dir="in"/>
-  </p:transition>
+  <mc:AlternateContent xmlns:mc="http://schemas.openxmlformats.org/markup-compatibility/2006">
+    <mc:Choice xmlns:p14="http://schemas.microsoft.com/office/powerpoint/2010/main" Requires="p14">
+      <p:transition p14:dur="0"/>
+    </mc:Choice>
+    <mc:Fallback>
+      <p:transition/>
+    </mc:Fallback>
+  </mc:AlternateContent>
   <p:timing>
     <p:tnLst>
       <p:par>
@@ -6285,9 +6406,14 @@
   <p:clrMapOvr>
     <a:masterClrMapping/>
   </p:clrMapOvr>
-  <p:transition>
-    <p:zoom dir="in"/>
-  </p:transition>
+  <mc:AlternateContent xmlns:mc="http://schemas.openxmlformats.org/markup-compatibility/2006">
+    <mc:Choice xmlns:p14="http://schemas.microsoft.com/office/powerpoint/2010/main" Requires="p14">
+      <p:transition p14:dur="0"/>
+    </mc:Choice>
+    <mc:Fallback>
+      <p:transition/>
+    </mc:Fallback>
+  </mc:AlternateContent>
   <p:timing>
     <p:tnLst>
       <p:par>
@@ -6436,8 +6562,8 @@
         </p:nvSpPr>
         <p:spPr>
           <a:xfrm>
-            <a:off x="6019800" y="1371600"/>
-            <a:ext cx="2909771" cy="4401205"/>
+            <a:off x="6019801" y="1371600"/>
+            <a:ext cx="3124200" cy="4093428"/>
           </a:xfrm>
           <a:prstGeom prst="rect">
             <a:avLst/>
@@ -6445,7 +6571,7 @@
           <a:noFill/>
         </p:spPr>
         <p:txBody>
-          <a:bodyPr wrap="none" rtlCol="0">
+          <a:bodyPr wrap="square" rtlCol="0">
             <a:spAutoFit/>
           </a:bodyPr>
           <a:lstStyle/>
@@ -6462,29 +6588,39 @@
               <a:rPr lang="en-US" sz="2000" dirty="0" smtClean="0"/>
               <a:t> </a:t>
             </a:r>
-          </a:p>
-          <a:p>
             <a:r>
               <a:rPr lang="en-US" sz="2000" dirty="0" smtClean="0"/>
-              <a:t>16 attributes and spoke</a:t>
-            </a:r>
-          </a:p>
-          <a:p>
+              <a:t>16 </a:t>
+            </a:r>
             <a:r>
               <a:rPr lang="en-US" sz="2000" dirty="0" smtClean="0"/>
-              <a:t>Represents how much</a:t>
-            </a:r>
-          </a:p>
-          <a:p>
+              <a:t>attributes and </a:t>
+            </a:r>
             <a:r>
               <a:rPr lang="en-US" sz="2000" dirty="0" smtClean="0"/>
-              <a:t>Occupation  has the </a:t>
-            </a:r>
-          </a:p>
-          <a:p>
-            <a:r>
-              <a:rPr lang="en-US" sz="2000" dirty="0" err="1" smtClean="0"/>
-              <a:t>Atttribute</a:t>
+              <a:t>spoke represents </a:t>
+            </a:r>
+            <a:r>
+              <a:rPr lang="en-US" sz="2000" dirty="0" smtClean="0"/>
+              <a:t>how </a:t>
+            </a:r>
+            <a:r>
+              <a:rPr lang="en-US" sz="2000" dirty="0" smtClean="0"/>
+              <a:t>much occupation has </a:t>
+            </a:r>
+            <a:r>
+              <a:rPr lang="en-US" sz="2000" dirty="0" smtClean="0"/>
+              <a:t>the </a:t>
+            </a:r>
+          </a:p>
+          <a:p>
+            <a:r>
+              <a:rPr lang="en-US" sz="2000" dirty="0"/>
+              <a:t>a</a:t>
+            </a:r>
+            <a:r>
+              <a:rPr lang="en-US" sz="2000" dirty="0" smtClean="0"/>
+              <a:t>ttribute</a:t>
             </a:r>
             <a:r>
               <a:rPr lang="en-US" sz="2000" dirty="0" smtClean="0"/>
@@ -6497,13 +6633,19 @@
           <a:p>
             <a:r>
               <a:rPr lang="en-US" sz="2000" dirty="0" smtClean="0"/>
-              <a:t>Gray area represents</a:t>
-            </a:r>
-          </a:p>
-          <a:p>
+              <a:t>Gray area </a:t>
+            </a:r>
             <a:r>
               <a:rPr lang="en-US" sz="2000" dirty="0" smtClean="0"/>
-              <a:t>A fictitious occupation</a:t>
+              <a:t>represents </a:t>
+            </a:r>
+            <a:r>
+              <a:rPr lang="en-US" sz="2000" smtClean="0"/>
+              <a:t>a fictitious </a:t>
+            </a:r>
+            <a:r>
+              <a:rPr lang="en-US" sz="2000" dirty="0" smtClean="0"/>
+              <a:t>occupation</a:t>
             </a:r>
           </a:p>
           <a:p>
@@ -6512,31 +6654,45 @@
           <a:p>
             <a:r>
               <a:rPr lang="en-US" sz="2000" dirty="0" smtClean="0"/>
-              <a:t>inner circle represents the </a:t>
-            </a:r>
-          </a:p>
-          <a:p>
+              <a:t>I</a:t>
+            </a:r>
             <a:r>
               <a:rPr lang="en-US" sz="2000" dirty="0" smtClean="0"/>
-              <a:t>dividing line between </a:t>
-            </a:r>
-          </a:p>
-          <a:p>
+              <a:t>nner </a:t>
+            </a:r>
             <a:r>
               <a:rPr lang="en-US" sz="2000" dirty="0" smtClean="0"/>
-              <a:t>professional occupations and</a:t>
-            </a:r>
-          </a:p>
-          <a:p>
+              <a:t>circle represents </a:t>
+            </a:r>
             <a:r>
               <a:rPr lang="en-US" sz="2000" dirty="0" smtClean="0"/>
-              <a:t>nonprofessional ones</a:t>
-            </a:r>
-          </a:p>
-          <a:p>
+              <a:t>the dividing </a:t>
+            </a:r>
             <a:r>
               <a:rPr lang="en-US" sz="2000" dirty="0" smtClean="0"/>
-              <a:t>(arbitrary no scale)</a:t>
+              <a:t>line </a:t>
+            </a:r>
+            <a:r>
+              <a:rPr lang="en-US" sz="2000" dirty="0" smtClean="0"/>
+              <a:t>between professional </a:t>
+            </a:r>
+            <a:r>
+              <a:rPr lang="en-US" sz="2000" dirty="0" smtClean="0"/>
+              <a:t>occupations </a:t>
+            </a:r>
+            <a:r>
+              <a:rPr lang="en-US" sz="2000" dirty="0" smtClean="0"/>
+              <a:t>and nonprofessional ones</a:t>
+            </a:r>
+          </a:p>
+          <a:p>
+            <a:r>
+              <a:rPr lang="en-US" sz="2000" dirty="0" smtClean="0"/>
+              <a:t>(arbitrary </a:t>
+            </a:r>
+            <a:r>
+              <a:rPr lang="en-US" sz="2000" dirty="0" smtClean="0"/>
+              <a:t>no scale)</a:t>
             </a:r>
             <a:endParaRPr lang="en-US" sz="2000" dirty="0"/>
           </a:p>
@@ -6547,9 +6703,14 @@
   <p:clrMapOvr>
     <a:masterClrMapping/>
   </p:clrMapOvr>
-  <p:transition>
-    <p:zoom dir="in"/>
-  </p:transition>
+  <mc:AlternateContent xmlns:mc="http://schemas.openxmlformats.org/markup-compatibility/2006">
+    <mc:Choice xmlns:p14="http://schemas.microsoft.com/office/powerpoint/2010/main" Requires="p14">
+      <p:transition p14:dur="0"/>
+    </mc:Choice>
+    <mc:Fallback>
+      <p:transition/>
+    </mc:Fallback>
+  </mc:AlternateContent>
   <p:timing>
     <p:tnLst>
       <p:par>
@@ -6747,9 +6908,14 @@
   <p:clrMapOvr>
     <a:masterClrMapping/>
   </p:clrMapOvr>
-  <p:transition>
-    <p:zoom dir="in"/>
-  </p:transition>
+  <mc:AlternateContent xmlns:mc="http://schemas.openxmlformats.org/markup-compatibility/2006">
+    <mc:Choice xmlns:p14="http://schemas.microsoft.com/office/powerpoint/2010/main" Requires="p14">
+      <p:transition p14:dur="0"/>
+    </mc:Choice>
+    <mc:Fallback>
+      <p:transition/>
+    </mc:Fallback>
+  </mc:AlternateContent>
   <p:timing>
     <p:tnLst>
       <p:par>
@@ -6902,9 +7068,14 @@
   <p:clrMapOvr>
     <a:masterClrMapping/>
   </p:clrMapOvr>
-  <p:transition>
-    <p:zoom dir="in"/>
-  </p:transition>
+  <mc:AlternateContent xmlns:mc="http://schemas.openxmlformats.org/markup-compatibility/2006">
+    <mc:Choice xmlns:p14="http://schemas.microsoft.com/office/powerpoint/2010/main" Requires="p14">
+      <p:transition p14:dur="0"/>
+    </mc:Choice>
+    <mc:Fallback>
+      <p:transition/>
+    </mc:Fallback>
+  </mc:AlternateContent>
   <p:timing>
     <p:tnLst>
       <p:par>
@@ -7106,9 +7277,14 @@
   <p:clrMapOvr>
     <a:masterClrMapping/>
   </p:clrMapOvr>
-  <p:transition>
-    <p:zoom dir="in"/>
-  </p:transition>
+  <mc:AlternateContent xmlns:mc="http://schemas.openxmlformats.org/markup-compatibility/2006">
+    <mc:Choice xmlns:p14="http://schemas.microsoft.com/office/powerpoint/2010/main" Requires="p14">
+      <p:transition p14:dur="0"/>
+    </mc:Choice>
+    <mc:Fallback>
+      <p:transition/>
+    </mc:Fallback>
+  </mc:AlternateContent>
   <p:timing>
     <p:tnLst>
       <p:par>
@@ -7259,9 +7435,14 @@
   <p:clrMapOvr>
     <a:masterClrMapping/>
   </p:clrMapOvr>
-  <p:transition>
-    <p:zoom dir="in"/>
-  </p:transition>
+  <mc:AlternateContent xmlns:mc="http://schemas.openxmlformats.org/markup-compatibility/2006">
+    <mc:Choice xmlns:p14="http://schemas.microsoft.com/office/powerpoint/2010/main" Requires="p14">
+      <p:transition p14:dur="0"/>
+    </mc:Choice>
+    <mc:Fallback>
+      <p:transition/>
+    </mc:Fallback>
+  </mc:AlternateContent>
   <p:timing>
     <p:tnLst>
       <p:par>
@@ -7399,9 +7580,14 @@
   <p:clrMapOvr>
     <a:masterClrMapping/>
   </p:clrMapOvr>
-  <p:transition>
-    <p:zoom dir="in"/>
-  </p:transition>
+  <mc:AlternateContent xmlns:mc="http://schemas.openxmlformats.org/markup-compatibility/2006">
+    <mc:Choice xmlns:p14="http://schemas.microsoft.com/office/powerpoint/2010/main" Requires="p14">
+      <p:transition p14:dur="0"/>
+    </mc:Choice>
+    <mc:Fallback>
+      <p:transition/>
+    </mc:Fallback>
+  </mc:AlternateContent>
   <p:timing>
     <p:tnLst>
       <p:par>
@@ -7527,9 +7713,14 @@
   <p:clrMapOvr>
     <a:masterClrMapping/>
   </p:clrMapOvr>
-  <p:transition>
-    <p:zoom dir="in"/>
-  </p:transition>
+  <mc:AlternateContent xmlns:mc="http://schemas.openxmlformats.org/markup-compatibility/2006">
+    <mc:Choice xmlns:p14="http://schemas.microsoft.com/office/powerpoint/2010/main" Requires="p14">
+      <p:transition p14:dur="0"/>
+    </mc:Choice>
+    <mc:Fallback>
+      <p:transition/>
+    </mc:Fallback>
+  </mc:AlternateContent>
   <p:timing>
     <p:tnLst>
       <p:par>
@@ -7667,9 +7858,14 @@
   <p:clrMapOvr>
     <a:masterClrMapping/>
   </p:clrMapOvr>
-  <p:transition>
-    <p:zoom dir="in"/>
-  </p:transition>
+  <mc:AlternateContent xmlns:mc="http://schemas.openxmlformats.org/markup-compatibility/2006">
+    <mc:Choice xmlns:p14="http://schemas.microsoft.com/office/powerpoint/2010/main" Requires="p14">
+      <p:transition p14:dur="0"/>
+    </mc:Choice>
+    <mc:Fallback>
+      <p:transition/>
+    </mc:Fallback>
+  </mc:AlternateContent>
   <p:timing>
     <p:tnLst>
       <p:par>
@@ -7834,9 +8030,14 @@
   <p:clrMapOvr>
     <a:masterClrMapping/>
   </p:clrMapOvr>
-  <p:transition>
-    <p:zoom dir="in"/>
-  </p:transition>
+  <mc:AlternateContent xmlns:mc="http://schemas.openxmlformats.org/markup-compatibility/2006">
+    <mc:Choice xmlns:p14="http://schemas.microsoft.com/office/powerpoint/2010/main" Requires="p14">
+      <p:transition p14:dur="0"/>
+    </mc:Choice>
+    <mc:Fallback>
+      <p:transition/>
+    </mc:Fallback>
+  </mc:AlternateContent>
   <p:timing>
     <p:tnLst>
       <p:par>
@@ -7976,9 +8177,14 @@
   <p:clrMapOvr>
     <a:masterClrMapping/>
   </p:clrMapOvr>
-  <p:transition>
-    <p:zoom dir="in"/>
-  </p:transition>
+  <mc:AlternateContent xmlns:mc="http://schemas.openxmlformats.org/markup-compatibility/2006">
+    <mc:Choice xmlns:p14="http://schemas.microsoft.com/office/powerpoint/2010/main" Requires="p14">
+      <p:transition p14:dur="0"/>
+    </mc:Choice>
+    <mc:Fallback>
+      <p:transition/>
+    </mc:Fallback>
+  </mc:AlternateContent>
   <p:timing>
     <p:tnLst>
       <p:par>
@@ -8185,9 +8391,14 @@
   <p:clrMapOvr>
     <a:masterClrMapping/>
   </p:clrMapOvr>
-  <p:transition>
-    <p:zoom dir="in"/>
-  </p:transition>
+  <mc:AlternateContent xmlns:mc="http://schemas.openxmlformats.org/markup-compatibility/2006">
+    <mc:Choice xmlns:p14="http://schemas.microsoft.com/office/powerpoint/2010/main" Requires="p14">
+      <p:transition p14:dur="0"/>
+    </mc:Choice>
+    <mc:Fallback>
+      <p:transition/>
+    </mc:Fallback>
+  </mc:AlternateContent>
   <p:timing>
     <p:tnLst>
       <p:par>
@@ -8352,9 +8563,14 @@
   <p:clrMapOvr>
     <a:masterClrMapping/>
   </p:clrMapOvr>
-  <p:transition>
-    <p:zoom dir="in"/>
-  </p:transition>
+  <mc:AlternateContent xmlns:mc="http://schemas.openxmlformats.org/markup-compatibility/2006">
+    <mc:Choice xmlns:p14="http://schemas.microsoft.com/office/powerpoint/2010/main" Requires="p14">
+      <p:transition p14:dur="0"/>
+    </mc:Choice>
+    <mc:Fallback>
+      <p:transition/>
+    </mc:Fallback>
+  </mc:AlternateContent>
   <p:timing>
     <p:tnLst>
       <p:par>
@@ -8515,9 +8731,14 @@
   <p:clrMapOvr>
     <a:masterClrMapping/>
   </p:clrMapOvr>
-  <p:transition>
-    <p:zoom dir="in"/>
-  </p:transition>
+  <mc:AlternateContent xmlns:mc="http://schemas.openxmlformats.org/markup-compatibility/2006">
+    <mc:Choice xmlns:p14="http://schemas.microsoft.com/office/powerpoint/2010/main" Requires="p14">
+      <p:transition p14:dur="0"/>
+    </mc:Choice>
+    <mc:Fallback>
+      <p:transition/>
+    </mc:Fallback>
+  </mc:AlternateContent>
   <p:timing>
     <p:tnLst>
       <p:par>
@@ -8654,9 +8875,14 @@
   <p:clrMapOvr>
     <a:masterClrMapping/>
   </p:clrMapOvr>
-  <p:transition>
-    <p:zoom dir="in"/>
-  </p:transition>
+  <mc:AlternateContent xmlns:mc="http://schemas.openxmlformats.org/markup-compatibility/2006">
+    <mc:Choice xmlns:p14="http://schemas.microsoft.com/office/powerpoint/2010/main" Requires="p14">
+      <p:transition p14:dur="0"/>
+    </mc:Choice>
+    <mc:Fallback>
+      <p:transition/>
+    </mc:Fallback>
+  </mc:AlternateContent>
   <p:timing>
     <p:tnLst>
       <p:par>
@@ -8816,9 +9042,14 @@
   <p:clrMapOvr>
     <a:masterClrMapping/>
   </p:clrMapOvr>
-  <p:transition>
-    <p:zoom dir="in"/>
-  </p:transition>
+  <mc:AlternateContent xmlns:mc="http://schemas.openxmlformats.org/markup-compatibility/2006">
+    <mc:Choice xmlns:p14="http://schemas.microsoft.com/office/powerpoint/2010/main" Requires="p14">
+      <p:transition p14:dur="0"/>
+    </mc:Choice>
+    <mc:Fallback>
+      <p:transition/>
+    </mc:Fallback>
+  </mc:AlternateContent>
   <p:timing>
     <p:tnLst>
       <p:par>
@@ -8954,9 +9185,14 @@
   <p:clrMapOvr>
     <a:masterClrMapping/>
   </p:clrMapOvr>
-  <p:transition>
-    <p:zoom dir="in"/>
-  </p:transition>
+  <mc:AlternateContent xmlns:mc="http://schemas.openxmlformats.org/markup-compatibility/2006">
+    <mc:Choice xmlns:p14="http://schemas.microsoft.com/office/powerpoint/2010/main" Requires="p14">
+      <p:transition p14:dur="0"/>
+    </mc:Choice>
+    <mc:Fallback>
+      <p:transition/>
+    </mc:Fallback>
+  </mc:AlternateContent>
   <p:timing>
     <p:tnLst>
       <p:par>
@@ -9105,9 +9341,14 @@
   <p:clrMapOvr>
     <a:masterClrMapping/>
   </p:clrMapOvr>
-  <p:transition>
-    <p:zoom dir="in"/>
-  </p:transition>
+  <mc:AlternateContent xmlns:mc="http://schemas.openxmlformats.org/markup-compatibility/2006">
+    <mc:Choice xmlns:p14="http://schemas.microsoft.com/office/powerpoint/2010/main" Requires="p14">
+      <p:transition p14:dur="0"/>
+    </mc:Choice>
+    <mc:Fallback>
+      <p:transition/>
+    </mc:Fallback>
+  </mc:AlternateContent>
   <p:timing>
     <p:tnLst>
       <p:par>
@@ -9283,9 +9524,14 @@
   <p:clrMapOvr>
     <a:masterClrMapping/>
   </p:clrMapOvr>
-  <p:transition>
-    <p:zoom dir="in"/>
-  </p:transition>
+  <mc:AlternateContent xmlns:mc="http://schemas.openxmlformats.org/markup-compatibility/2006">
+    <mc:Choice xmlns:p14="http://schemas.microsoft.com/office/powerpoint/2010/main" Requires="p14">
+      <p:transition p14:dur="0"/>
+    </mc:Choice>
+    <mc:Fallback>
+      <p:transition/>
+    </mc:Fallback>
+  </mc:AlternateContent>
   <p:timing>
     <p:tnLst>
       <p:par>
@@ -9416,9 +9662,14 @@
   <p:clrMapOvr>
     <a:masterClrMapping/>
   </p:clrMapOvr>
-  <p:transition>
-    <p:zoom dir="in"/>
-  </p:transition>
+  <mc:AlternateContent xmlns:mc="http://schemas.openxmlformats.org/markup-compatibility/2006">
+    <mc:Choice xmlns:p14="http://schemas.microsoft.com/office/powerpoint/2010/main" Requires="p14">
+      <p:transition p14:dur="0"/>
+    </mc:Choice>
+    <mc:Fallback>
+      <p:transition/>
+    </mc:Fallback>
+  </mc:AlternateContent>
 </p:sld>
 </file>
 
@@ -9575,9 +9826,14 @@
   <p:clrMapOvr>
     <a:masterClrMapping/>
   </p:clrMapOvr>
-  <p:transition>
-    <p:zoom dir="in"/>
-  </p:transition>
+  <mc:AlternateContent xmlns:mc="http://schemas.openxmlformats.org/markup-compatibility/2006">
+    <mc:Choice xmlns:p14="http://schemas.microsoft.com/office/powerpoint/2010/main" Requires="p14">
+      <p:transition p14:dur="0"/>
+    </mc:Choice>
+    <mc:Fallback>
+      <p:transition/>
+    </mc:Fallback>
+  </mc:AlternateContent>
 </p:sld>
 </file>
 
@@ -9740,9 +9996,14 @@
   <p:clrMapOvr>
     <a:masterClrMapping/>
   </p:clrMapOvr>
-  <p:transition>
-    <p:zoom dir="in"/>
-  </p:transition>
+  <mc:AlternateContent xmlns:mc="http://schemas.openxmlformats.org/markup-compatibility/2006">
+    <mc:Choice xmlns:p14="http://schemas.microsoft.com/office/powerpoint/2010/main" Requires="p14">
+      <p:transition p14:dur="0"/>
+    </mc:Choice>
+    <mc:Fallback>
+      <p:transition/>
+    </mc:Fallback>
+  </mc:AlternateContent>
 </p:sld>
 </file>
 
@@ -9899,9 +10160,14 @@
   <p:clrMapOvr>
     <a:masterClrMapping/>
   </p:clrMapOvr>
-  <p:transition>
-    <p:zoom dir="in"/>
-  </p:transition>
+  <mc:AlternateContent xmlns:mc="http://schemas.openxmlformats.org/markup-compatibility/2006">
+    <mc:Choice xmlns:p14="http://schemas.microsoft.com/office/powerpoint/2010/main" Requires="p14">
+      <p:transition p14:dur="0"/>
+    </mc:Choice>
+    <mc:Fallback>
+      <p:transition/>
+    </mc:Fallback>
+  </mc:AlternateContent>
 </p:sld>
 </file>
 
@@ -10056,9 +10322,14 @@
   <p:clrMapOvr>
     <a:masterClrMapping/>
   </p:clrMapOvr>
-  <p:transition>
-    <p:zoom dir="in"/>
-  </p:transition>
+  <mc:AlternateContent xmlns:mc="http://schemas.openxmlformats.org/markup-compatibility/2006">
+    <mc:Choice xmlns:p14="http://schemas.microsoft.com/office/powerpoint/2010/main" Requires="p14">
+      <p:transition p14:dur="0"/>
+    </mc:Choice>
+    <mc:Fallback>
+      <p:transition/>
+    </mc:Fallback>
+  </mc:AlternateContent>
 </p:sld>
 </file>
 
@@ -10227,15 +10498,7 @@
             </a:r>
             <a:r>
               <a:rPr lang="en-US" sz="2400" dirty="0" smtClean="0"/>
-              <a:t>for </a:t>
-            </a:r>
-            <a:r>
-              <a:rPr lang="en-US" sz="2400" dirty="0" smtClean="0"/>
-              <a:t>classes </a:t>
-            </a:r>
-            <a:r>
-              <a:rPr lang="en-US" sz="2400" dirty="0" smtClean="0"/>
-              <a:t>and </a:t>
+              <a:t>for classes and </a:t>
             </a:r>
             <a:r>
               <a:rPr lang="en-US" sz="2400" dirty="0"/>
@@ -10326,9 +10589,14 @@
   <p:clrMapOvr>
     <a:masterClrMapping/>
   </p:clrMapOvr>
-  <p:transition>
-    <p:zoom dir="in"/>
-  </p:transition>
+  <mc:AlternateContent xmlns:mc="http://schemas.openxmlformats.org/markup-compatibility/2006">
+    <mc:Choice xmlns:p14="http://schemas.microsoft.com/office/powerpoint/2010/main" Requires="p14">
+      <p:transition p14:dur="0"/>
+    </mc:Choice>
+    <mc:Fallback>
+      <p:transition/>
+    </mc:Fallback>
+  </mc:AlternateContent>
   <p:timing>
     <p:tnLst>
       <p:par>
@@ -10459,9 +10727,14 @@
   <p:clrMapOvr>
     <a:masterClrMapping/>
   </p:clrMapOvr>
-  <p:transition>
-    <p:zoom dir="in"/>
-  </p:transition>
+  <mc:AlternateContent xmlns:mc="http://schemas.openxmlformats.org/markup-compatibility/2006">
+    <mc:Choice xmlns:p14="http://schemas.microsoft.com/office/powerpoint/2010/main" Requires="p14">
+      <p:transition p14:dur="0"/>
+    </mc:Choice>
+    <mc:Fallback>
+      <p:transition/>
+    </mc:Fallback>
+  </mc:AlternateContent>
 </p:sld>
 </file>
 
@@ -10602,9 +10875,21 @@
   <p:clrMapOvr>
     <a:masterClrMapping/>
   </p:clrMapOvr>
-  <p:transition>
-    <p:zoom dir="in"/>
-  </p:transition>
+  <mc:AlternateContent xmlns:mc="http://schemas.openxmlformats.org/markup-compatibility/2006">
+    <mc:Choice xmlns:p14="http://schemas.microsoft.com/office/powerpoint/2010/main" Requires="p14">
+      <p:transition p14:dur="0"/>
+    </mc:Choice>
+    <mc:Fallback>
+      <p:transition/>
+    </mc:Fallback>
+  </mc:AlternateContent>
+  <p:timing>
+    <p:tnLst>
+      <p:par>
+        <p:cTn id="1" dur="indefinite" restart="never" nodeType="tmRoot"/>
+      </p:par>
+    </p:tnLst>
+  </p:timing>
 </p:sld>
 </file>
 
@@ -10763,9 +11048,21 @@
   <p:clrMapOvr>
     <a:masterClrMapping/>
   </p:clrMapOvr>
-  <p:transition>
-    <p:zoom dir="in"/>
-  </p:transition>
+  <mc:AlternateContent xmlns:mc="http://schemas.openxmlformats.org/markup-compatibility/2006">
+    <mc:Choice xmlns:p14="http://schemas.microsoft.com/office/powerpoint/2010/main" Requires="p14">
+      <p:transition p14:dur="0"/>
+    </mc:Choice>
+    <mc:Fallback>
+      <p:transition/>
+    </mc:Fallback>
+  </mc:AlternateContent>
+  <p:timing>
+    <p:tnLst>
+      <p:par>
+        <p:cTn id="1" dur="indefinite" restart="never" nodeType="tmRoot"/>
+      </p:par>
+    </p:tnLst>
+  </p:timing>
 </p:sld>
 </file>
 
@@ -10898,9 +11195,21 @@
   <p:clrMapOvr>
     <a:masterClrMapping/>
   </p:clrMapOvr>
-  <p:transition>
-    <p:zoom dir="in"/>
-  </p:transition>
+  <mc:AlternateContent xmlns:mc="http://schemas.openxmlformats.org/markup-compatibility/2006">
+    <mc:Choice xmlns:p14="http://schemas.microsoft.com/office/powerpoint/2010/main" Requires="p14">
+      <p:transition p14:dur="0"/>
+    </mc:Choice>
+    <mc:Fallback>
+      <p:transition/>
+    </mc:Fallback>
+  </mc:AlternateContent>
+  <p:timing>
+    <p:tnLst>
+      <p:par>
+        <p:cTn id="1" dur="indefinite" restart="never" nodeType="tmRoot"/>
+      </p:par>
+    </p:tnLst>
+  </p:timing>
 </p:sld>
 </file>
 
@@ -11074,9 +11383,21 @@
   <p:clrMapOvr>
     <a:masterClrMapping/>
   </p:clrMapOvr>
-  <p:transition>
-    <p:zoom dir="in"/>
-  </p:transition>
+  <mc:AlternateContent xmlns:mc="http://schemas.openxmlformats.org/markup-compatibility/2006">
+    <mc:Choice xmlns:p14="http://schemas.microsoft.com/office/powerpoint/2010/main" Requires="p14">
+      <p:transition p14:dur="0"/>
+    </mc:Choice>
+    <mc:Fallback>
+      <p:transition/>
+    </mc:Fallback>
+  </mc:AlternateContent>
+  <p:timing>
+    <p:tnLst>
+      <p:par>
+        <p:cTn id="1" dur="indefinite" restart="never" nodeType="tmRoot"/>
+      </p:par>
+    </p:tnLst>
+  </p:timing>
 </p:sld>
 </file>
 
@@ -11237,9 +11558,21 @@
   <p:clrMapOvr>
     <a:masterClrMapping/>
   </p:clrMapOvr>
-  <p:transition>
-    <p:zoom dir="in"/>
-  </p:transition>
+  <mc:AlternateContent xmlns:mc="http://schemas.openxmlformats.org/markup-compatibility/2006">
+    <mc:Choice xmlns:p14="http://schemas.microsoft.com/office/powerpoint/2010/main" Requires="p14">
+      <p:transition p14:dur="0"/>
+    </mc:Choice>
+    <mc:Fallback>
+      <p:transition/>
+    </mc:Fallback>
+  </mc:AlternateContent>
+  <p:timing>
+    <p:tnLst>
+      <p:par>
+        <p:cTn id="1" dur="indefinite" restart="never" nodeType="tmRoot"/>
+      </p:par>
+    </p:tnLst>
+  </p:timing>
 </p:sld>
 </file>
 
@@ -11360,9 +11693,21 @@
   <p:clrMapOvr>
     <a:masterClrMapping/>
   </p:clrMapOvr>
-  <p:transition>
-    <p:zoom dir="in"/>
-  </p:transition>
+  <mc:AlternateContent xmlns:mc="http://schemas.openxmlformats.org/markup-compatibility/2006">
+    <mc:Choice xmlns:p14="http://schemas.microsoft.com/office/powerpoint/2010/main" Requires="p14">
+      <p:transition p14:dur="0"/>
+    </mc:Choice>
+    <mc:Fallback>
+      <p:transition/>
+    </mc:Fallback>
+  </mc:AlternateContent>
+  <p:timing>
+    <p:tnLst>
+      <p:par>
+        <p:cTn id="1" dur="indefinite" restart="never" nodeType="tmRoot"/>
+      </p:par>
+    </p:tnLst>
+  </p:timing>
 </p:sld>
 </file>
 
@@ -11521,9 +11866,21 @@
   <p:clrMapOvr>
     <a:masterClrMapping/>
   </p:clrMapOvr>
-  <p:transition>
-    <p:zoom dir="in"/>
-  </p:transition>
+  <mc:AlternateContent xmlns:mc="http://schemas.openxmlformats.org/markup-compatibility/2006">
+    <mc:Choice xmlns:p14="http://schemas.microsoft.com/office/powerpoint/2010/main" Requires="p14">
+      <p:transition p14:dur="0"/>
+    </mc:Choice>
+    <mc:Fallback>
+      <p:transition/>
+    </mc:Fallback>
+  </mc:AlternateContent>
+  <p:timing>
+    <p:tnLst>
+      <p:par>
+        <p:cTn id="1" dur="indefinite" restart="never" nodeType="tmRoot"/>
+      </p:par>
+    </p:tnLst>
+  </p:timing>
 </p:sld>
 </file>
 
@@ -11662,9 +12019,21 @@
   <p:clrMapOvr>
     <a:masterClrMapping/>
   </p:clrMapOvr>
-  <p:transition>
-    <p:zoom dir="in"/>
-  </p:transition>
+  <mc:AlternateContent xmlns:mc="http://schemas.openxmlformats.org/markup-compatibility/2006">
+    <mc:Choice xmlns:p14="http://schemas.microsoft.com/office/powerpoint/2010/main" Requires="p14">
+      <p:transition p14:dur="0"/>
+    </mc:Choice>
+    <mc:Fallback>
+      <p:transition/>
+    </mc:Fallback>
+  </mc:AlternateContent>
+  <p:timing>
+    <p:tnLst>
+      <p:par>
+        <p:cTn id="1" dur="indefinite" restart="never" nodeType="tmRoot"/>
+      </p:par>
+    </p:tnLst>
+  </p:timing>
 </p:sld>
 </file>
 
@@ -11813,9 +12182,21 @@
   <p:clrMapOvr>
     <a:masterClrMapping/>
   </p:clrMapOvr>
-  <p:transition>
-    <p:zoom dir="in"/>
-  </p:transition>
+  <mc:AlternateContent xmlns:mc="http://schemas.openxmlformats.org/markup-compatibility/2006">
+    <mc:Choice xmlns:p14="http://schemas.microsoft.com/office/powerpoint/2010/main" Requires="p14">
+      <p:transition p14:dur="0"/>
+    </mc:Choice>
+    <mc:Fallback>
+      <p:transition/>
+    </mc:Fallback>
+  </mc:AlternateContent>
+  <p:timing>
+    <p:tnLst>
+      <p:par>
+        <p:cTn id="1" dur="indefinite" restart="never" nodeType="tmRoot"/>
+      </p:par>
+    </p:tnLst>
+  </p:timing>
 </p:sld>
 </file>
 
@@ -11967,9 +12348,14 @@
   <p:clrMapOvr>
     <a:masterClrMapping/>
   </p:clrMapOvr>
-  <p:transition>
-    <p:zoom dir="in"/>
-  </p:transition>
+  <mc:AlternateContent xmlns:mc="http://schemas.openxmlformats.org/markup-compatibility/2006">
+    <mc:Choice xmlns:p14="http://schemas.microsoft.com/office/powerpoint/2010/main" Requires="p14">
+      <p:transition p14:dur="0"/>
+    </mc:Choice>
+    <mc:Fallback>
+      <p:transition/>
+    </mc:Fallback>
+  </mc:AlternateContent>
   <p:timing>
     <p:tnLst>
       <p:par>
@@ -12152,9 +12538,14 @@
   <p:clrMapOvr>
     <a:masterClrMapping/>
   </p:clrMapOvr>
-  <p:transition>
-    <p:zoom dir="in"/>
-  </p:transition>
+  <mc:AlternateContent xmlns:mc="http://schemas.openxmlformats.org/markup-compatibility/2006">
+    <mc:Choice xmlns:p14="http://schemas.microsoft.com/office/powerpoint/2010/main" Requires="p14">
+      <p:transition p14:dur="0"/>
+    </mc:Choice>
+    <mc:Fallback>
+      <p:transition/>
+    </mc:Fallback>
+  </mc:AlternateContent>
 </p:sld>
 </file>
 
@@ -12313,9 +12704,14 @@
   <p:clrMapOvr>
     <a:masterClrMapping/>
   </p:clrMapOvr>
-  <p:transition>
-    <p:zoom dir="in"/>
-  </p:transition>
+  <mc:AlternateContent xmlns:mc="http://schemas.openxmlformats.org/markup-compatibility/2006">
+    <mc:Choice xmlns:p14="http://schemas.microsoft.com/office/powerpoint/2010/main" Requires="p14">
+      <p:transition p14:dur="0"/>
+    </mc:Choice>
+    <mc:Fallback>
+      <p:transition/>
+    </mc:Fallback>
+  </mc:AlternateContent>
 </p:sld>
 </file>
 
@@ -12526,9 +12922,14 @@
   <p:clrMapOvr>
     <a:masterClrMapping/>
   </p:clrMapOvr>
-  <p:transition>
-    <p:zoom dir="in"/>
-  </p:transition>
+  <mc:AlternateContent xmlns:mc="http://schemas.openxmlformats.org/markup-compatibility/2006">
+    <mc:Choice xmlns:p14="http://schemas.microsoft.com/office/powerpoint/2010/main" Requires="p14">
+      <p:transition p14:dur="0"/>
+    </mc:Choice>
+    <mc:Fallback>
+      <p:transition/>
+    </mc:Fallback>
+  </mc:AlternateContent>
 </p:sld>
 </file>
 
@@ -12681,9 +13082,14 @@
   <p:clrMapOvr>
     <a:masterClrMapping/>
   </p:clrMapOvr>
-  <p:transition>
-    <p:zoom dir="in"/>
-  </p:transition>
+  <mc:AlternateContent xmlns:mc="http://schemas.openxmlformats.org/markup-compatibility/2006">
+    <mc:Choice xmlns:p14="http://schemas.microsoft.com/office/powerpoint/2010/main" Requires="p14">
+      <p:transition p14:dur="0"/>
+    </mc:Choice>
+    <mc:Fallback>
+      <p:transition/>
+    </mc:Fallback>
+  </mc:AlternateContent>
   <p:timing>
     <p:tnLst>
       <p:par>
@@ -12854,9 +13260,14 @@
   <p:clrMapOvr>
     <a:masterClrMapping/>
   </p:clrMapOvr>
-  <p:transition>
-    <p:zoom dir="in"/>
-  </p:transition>
+  <mc:AlternateContent xmlns:mc="http://schemas.openxmlformats.org/markup-compatibility/2006">
+    <mc:Choice xmlns:p14="http://schemas.microsoft.com/office/powerpoint/2010/main" Requires="p14">
+      <p:transition p14:dur="0"/>
+    </mc:Choice>
+    <mc:Fallback>
+      <p:transition/>
+    </mc:Fallback>
+  </mc:AlternateContent>
   <p:timing>
     <p:tnLst>
       <p:par>
@@ -13017,9 +13428,14 @@
   <p:clrMapOvr>
     <a:masterClrMapping/>
   </p:clrMapOvr>
-  <p:transition>
-    <p:zoom dir="in"/>
-  </p:transition>
+  <mc:AlternateContent xmlns:mc="http://schemas.openxmlformats.org/markup-compatibility/2006">
+    <mc:Choice xmlns:p14="http://schemas.microsoft.com/office/powerpoint/2010/main" Requires="p14">
+      <p:transition p14:dur="0"/>
+    </mc:Choice>
+    <mc:Fallback>
+      <p:transition/>
+    </mc:Fallback>
+  </mc:AlternateContent>
   <p:timing>
     <p:tnLst>
       <p:par>
@@ -13174,9 +13590,14 @@
   <p:clrMapOvr>
     <a:masterClrMapping/>
   </p:clrMapOvr>
-  <p:transition>
-    <p:zoom dir="in"/>
-  </p:transition>
+  <mc:AlternateContent xmlns:mc="http://schemas.openxmlformats.org/markup-compatibility/2006">
+    <mc:Choice xmlns:p14="http://schemas.microsoft.com/office/powerpoint/2010/main" Requires="p14">
+      <p:transition p14:dur="0"/>
+    </mc:Choice>
+    <mc:Fallback>
+      <p:transition/>
+    </mc:Fallback>
+  </mc:AlternateContent>
   <p:timing>
     <p:tnLst>
       <p:par>

</xml_diff>